<commit_message>
Finished tweaks on data-viz-01
</commit_message>
<xml_diff>
--- a/data-viz-01/component/change-color.pptx
+++ b/data-viz-01/component/change-color.pptx
@@ -754,6 +754,1182 @@
             <a:fld id="{18BDFEC3-8487-43E8-A154-7C12CBC1FFF2}" type="slidenum">
               <a:rPr lang="en-US"/>
               <a:t>2</a:t>
+            </a:fld>
+            <a:endParaRPr lang="en-US"/>
+          </a:p>
+        </p:txBody>
+      </p:sp>
+    </p:spTree>
+  </p:cSld>
+</p:notes>
+</file>
+
+<file path=ppt/notesSlides/notesSlide2.xml><?xml version="1.0" encoding="utf-8"?>
+<p:notes xmlns:a="http://schemas.openxmlformats.org/drawingml/2006/main" xmlns:r="http://schemas.openxmlformats.org/officeDocument/2006/relationships" xmlns:p="http://schemas.openxmlformats.org/presentationml/2006/main">
+  <p:cSld>
+    <p:spTree>
+      <p:nvGrpSpPr>
+        <p:cNvPr id="1" name=""/>
+        <p:cNvGrpSpPr/>
+        <p:nvPr/>
+      </p:nvGrpSpPr>
+      <p:grpSpPr>
+        <a:xfrm>
+          <a:off x="0" y="0"/>
+          <a:ext cx="0" cy="0"/>
+          <a:chOff x="0" y="0"/>
+          <a:chExt cx="0" cy="0"/>
+        </a:xfrm>
+      </p:grpSpPr>
+      <p:sp>
+        <p:nvSpPr>
+          <p:cNvPr id="2" name="Slide Image Placeholder 1"/>
+          <p:cNvSpPr>
+            <a:spLocks noGrp="1" noRot="1" noChangeAspect="1"/>
+          </p:cNvSpPr>
+          <p:nvPr>
+            <p:ph type="sldImg"/>
+          </p:nvPr>
+        </p:nvSpPr>
+        <p:spPr/>
+      </p:sp>
+      <p:sp>
+        <p:nvSpPr>
+          <p:cNvPr id="3" name="Notes Placeholder 2"/>
+          <p:cNvSpPr>
+            <a:spLocks noGrp="1"/>
+          </p:cNvSpPr>
+          <p:nvPr>
+            <p:ph type="body" idx="1"/>
+          </p:nvPr>
+        </p:nvSpPr>
+        <p:spPr/>
+        <p:txBody>
+          <a:bodyPr/>
+          <a:lstStyle/>
+          <a:p>
+            <a:pPr lvl="0" marL="0" indent="0">
+              <a:buNone/>
+            </a:pPr>
+            <a:r>
+              <a:rPr/>
+              <a:t>In</a:t>
+            </a:r>
+            <a:r>
+              <a:rPr/>
+              <a:t> </a:t>
+            </a:r>
+            <a:r>
+              <a:rPr/>
+              <a:t>Altair/Python,</a:t>
+            </a:r>
+            <a:r>
+              <a:rPr/>
+              <a:t> </a:t>
+            </a:r>
+            <a:r>
+              <a:rPr/>
+              <a:t>the</a:t>
+            </a:r>
+            <a:r>
+              <a:rPr/>
+              <a:t> </a:t>
+            </a:r>
+            <a:r>
+              <a:rPr/>
+              <a:t>variable</a:t>
+            </a:r>
+            <a:r>
+              <a:rPr/>
+              <a:t> </a:t>
+            </a:r>
+            <a:r>
+              <a:rPr/>
+              <a:t>associated</a:t>
+            </a:r>
+            <a:r>
+              <a:rPr/>
+              <a:t> </a:t>
+            </a:r>
+            <a:r>
+              <a:rPr/>
+              <a:t>with</a:t>
+            </a:r>
+            <a:r>
+              <a:rPr/>
+              <a:t> </a:t>
+            </a:r>
+            <a:r>
+              <a:rPr/>
+              <a:t>different</a:t>
+            </a:r>
+            <a:r>
+              <a:rPr/>
+              <a:t> </a:t>
+            </a:r>
+            <a:r>
+              <a:rPr/>
+              <a:t>colors</a:t>
+            </a:r>
+            <a:r>
+              <a:rPr/>
+              <a:t> </a:t>
+            </a:r>
+            <a:r>
+              <a:rPr/>
+              <a:t>goes</a:t>
+            </a:r>
+            <a:r>
+              <a:rPr/>
+              <a:t> </a:t>
+            </a:r>
+            <a:r>
+              <a:rPr/>
+              <a:t>inside</a:t>
+            </a:r>
+            <a:r>
+              <a:rPr/>
+              <a:t> </a:t>
+            </a:r>
+            <a:r>
+              <a:rPr/>
+              <a:t>the</a:t>
+            </a:r>
+            <a:r>
+              <a:rPr/>
+              <a:t> </a:t>
+            </a:r>
+            <a:r>
+              <a:rPr/>
+              <a:t>encode</a:t>
+            </a:r>
+            <a:r>
+              <a:rPr/>
+              <a:t> </a:t>
+            </a:r>
+            <a:r>
+              <a:rPr/>
+              <a:t>function.</a:t>
+            </a:r>
+          </a:p>
+        </p:txBody>
+      </p:sp>
+      <p:sp>
+        <p:nvSpPr>
+          <p:cNvPr id="4" name="Slide Number Placeholder 3"/>
+          <p:cNvSpPr>
+            <a:spLocks noGrp="1"/>
+          </p:cNvSpPr>
+          <p:nvPr>
+            <p:ph type="sldNum" sz="quarter" idx="10"/>
+          </p:nvPr>
+        </p:nvSpPr>
+        <p:spPr/>
+        <p:txBody>
+          <a:bodyPr/>
+          <a:lstStyle/>
+          <a:p>
+            <a:fld id="{18BDFEC3-8487-43E8-A154-7C12CBC1FFF2}" type="slidenum">
+              <a:rPr lang="en-US"/>
+              <a:t>3</a:t>
+            </a:fld>
+            <a:endParaRPr lang="en-US"/>
+          </a:p>
+        </p:txBody>
+      </p:sp>
+    </p:spTree>
+  </p:cSld>
+</p:notes>
+</file>
+
+<file path=ppt/notesSlides/notesSlide3.xml><?xml version="1.0" encoding="utf-8"?>
+<p:notes xmlns:a="http://schemas.openxmlformats.org/drawingml/2006/main" xmlns:r="http://schemas.openxmlformats.org/officeDocument/2006/relationships" xmlns:p="http://schemas.openxmlformats.org/presentationml/2006/main">
+  <p:cSld>
+    <p:spTree>
+      <p:nvGrpSpPr>
+        <p:cNvPr id="1" name=""/>
+        <p:cNvGrpSpPr/>
+        <p:nvPr/>
+      </p:nvGrpSpPr>
+      <p:grpSpPr>
+        <a:xfrm>
+          <a:off x="0" y="0"/>
+          <a:ext cx="0" cy="0"/>
+          <a:chOff x="0" y="0"/>
+          <a:chExt cx="0" cy="0"/>
+        </a:xfrm>
+      </p:grpSpPr>
+      <p:sp>
+        <p:nvSpPr>
+          <p:cNvPr id="2" name="Slide Image Placeholder 1"/>
+          <p:cNvSpPr>
+            <a:spLocks noGrp="1" noRot="1" noChangeAspect="1"/>
+          </p:cNvSpPr>
+          <p:nvPr>
+            <p:ph type="sldImg"/>
+          </p:nvPr>
+        </p:nvSpPr>
+        <p:spPr/>
+      </p:sp>
+      <p:sp>
+        <p:nvSpPr>
+          <p:cNvPr id="3" name="Notes Placeholder 2"/>
+          <p:cNvSpPr>
+            <a:spLocks noGrp="1"/>
+          </p:cNvSpPr>
+          <p:nvPr>
+            <p:ph type="body" idx="1"/>
+          </p:nvPr>
+        </p:nvSpPr>
+        <p:spPr/>
+        <p:txBody>
+          <a:bodyPr/>
+          <a:lstStyle/>
+          <a:p>
+            <a:pPr lvl="0" marL="0" indent="0">
+              <a:buNone/>
+            </a:pPr>
+            <a:r>
+              <a:rPr/>
+              <a:t>Notice</a:t>
+            </a:r>
+            <a:r>
+              <a:rPr/>
+              <a:t> </a:t>
+            </a:r>
+            <a:r>
+              <a:rPr/>
+              <a:t>that</a:t>
+            </a:r>
+            <a:r>
+              <a:rPr/>
+              <a:t> </a:t>
+            </a:r>
+            <a:r>
+              <a:rPr/>
+              <a:t>Altair/Python</a:t>
+            </a:r>
+            <a:r>
+              <a:rPr/>
+              <a:t> </a:t>
+            </a:r>
+            <a:r>
+              <a:rPr/>
+              <a:t>used</a:t>
+            </a:r>
+            <a:r>
+              <a:rPr/>
+              <a:t> </a:t>
+            </a:r>
+            <a:r>
+              <a:rPr/>
+              <a:t>a</a:t>
+            </a:r>
+            <a:r>
+              <a:rPr/>
+              <a:t> </a:t>
+            </a:r>
+            <a:r>
+              <a:rPr/>
+              <a:t>gradient</a:t>
+            </a:r>
+            <a:r>
+              <a:rPr/>
+              <a:t> </a:t>
+            </a:r>
+            <a:r>
+              <a:rPr/>
+              <a:t>of</a:t>
+            </a:r>
+            <a:r>
+              <a:rPr/>
+              <a:t> </a:t>
+            </a:r>
+            <a:r>
+              <a:rPr/>
+              <a:t>colors.</a:t>
+            </a:r>
+            <a:r>
+              <a:rPr/>
+              <a:t> </a:t>
+            </a:r>
+            <a:r>
+              <a:rPr/>
+              <a:t>This</a:t>
+            </a:r>
+            <a:r>
+              <a:rPr/>
+              <a:t> </a:t>
+            </a:r>
+            <a:r>
+              <a:rPr/>
+              <a:t>is</a:t>
+            </a:r>
+            <a:r>
+              <a:rPr/>
+              <a:t> </a:t>
+            </a:r>
+            <a:r>
+              <a:rPr/>
+              <a:t>a</a:t>
+            </a:r>
+            <a:r>
+              <a:rPr/>
+              <a:t> </a:t>
+            </a:r>
+            <a:r>
+              <a:rPr/>
+              <a:t>good</a:t>
+            </a:r>
+            <a:r>
+              <a:rPr/>
+              <a:t> </a:t>
+            </a:r>
+            <a:r>
+              <a:rPr/>
+              <a:t>choice.</a:t>
+            </a:r>
+          </a:p>
+          <a:p>
+            <a:pPr lvl="0" marL="0" indent="0">
+              <a:buNone/>
+            </a:pPr>
+          </a:p>
+          <a:p>
+            <a:pPr lvl="0" marL="0" indent="0">
+              <a:buNone/>
+            </a:pPr>
+            <a:r>
+              <a:rPr/>
+              <a:t>The</a:t>
+            </a:r>
+            <a:r>
+              <a:rPr/>
+              <a:t> </a:t>
+            </a:r>
+            <a:r>
+              <a:rPr/>
+              <a:t>darker</a:t>
+            </a:r>
+            <a:r>
+              <a:rPr/>
+              <a:t> </a:t>
+            </a:r>
+            <a:r>
+              <a:rPr/>
+              <a:t>colors,</a:t>
+            </a:r>
+            <a:r>
+              <a:rPr/>
+              <a:t> </a:t>
+            </a:r>
+            <a:r>
+              <a:rPr/>
+              <a:t>associated</a:t>
+            </a:r>
+            <a:r>
+              <a:rPr/>
+              <a:t> </a:t>
+            </a:r>
+            <a:r>
+              <a:rPr/>
+              <a:t>with</a:t>
+            </a:r>
+            <a:r>
+              <a:rPr/>
+              <a:t> </a:t>
+            </a:r>
+            <a:r>
+              <a:rPr/>
+              <a:t>a</a:t>
+            </a:r>
+            <a:r>
+              <a:rPr/>
+              <a:t> </a:t>
+            </a:r>
+            <a:r>
+              <a:rPr/>
+              <a:t>larger</a:t>
+            </a:r>
+            <a:r>
+              <a:rPr/>
+              <a:t> </a:t>
+            </a:r>
+            <a:r>
+              <a:rPr/>
+              <a:t>number</a:t>
+            </a:r>
+            <a:r>
+              <a:rPr/>
+              <a:t> </a:t>
+            </a:r>
+            <a:r>
+              <a:rPr/>
+              <a:t>of</a:t>
+            </a:r>
+            <a:r>
+              <a:rPr/>
+              <a:t> </a:t>
+            </a:r>
+            <a:r>
+              <a:rPr/>
+              <a:t>bathrooms</a:t>
+            </a:r>
+            <a:r>
+              <a:rPr/>
+              <a:t> </a:t>
+            </a:r>
+            <a:r>
+              <a:rPr/>
+              <a:t>cluster</a:t>
+            </a:r>
+            <a:r>
+              <a:rPr/>
+              <a:t> </a:t>
+            </a:r>
+            <a:r>
+              <a:rPr/>
+              <a:t>to</a:t>
+            </a:r>
+            <a:r>
+              <a:rPr/>
+              <a:t> </a:t>
+            </a:r>
+            <a:r>
+              <a:rPr/>
+              <a:t>the</a:t>
+            </a:r>
+            <a:r>
+              <a:rPr/>
+              <a:t> </a:t>
+            </a:r>
+            <a:r>
+              <a:rPr/>
+              <a:t>left.</a:t>
+            </a:r>
+            <a:r>
+              <a:rPr/>
+              <a:t> </a:t>
+            </a:r>
+            <a:r>
+              <a:rPr/>
+              <a:t>Newer</a:t>
+            </a:r>
+            <a:r>
+              <a:rPr/>
+              <a:t> </a:t>
+            </a:r>
+            <a:r>
+              <a:rPr/>
+              <a:t>houses</a:t>
+            </a:r>
+            <a:r>
+              <a:rPr/>
+              <a:t> </a:t>
+            </a:r>
+            <a:r>
+              <a:rPr/>
+              <a:t>tend</a:t>
+            </a:r>
+            <a:r>
+              <a:rPr/>
+              <a:t> </a:t>
+            </a:r>
+            <a:r>
+              <a:rPr/>
+              <a:t>to</a:t>
+            </a:r>
+            <a:r>
+              <a:rPr/>
+              <a:t> </a:t>
+            </a:r>
+            <a:r>
+              <a:rPr/>
+              <a:t>have</a:t>
+            </a:r>
+            <a:r>
+              <a:rPr/>
+              <a:t> </a:t>
+            </a:r>
+            <a:r>
+              <a:rPr/>
+              <a:t>more</a:t>
+            </a:r>
+            <a:r>
+              <a:rPr/>
+              <a:t> </a:t>
+            </a:r>
+            <a:r>
+              <a:rPr/>
+              <a:t>bathrooms.</a:t>
+            </a:r>
+          </a:p>
+        </p:txBody>
+      </p:sp>
+      <p:sp>
+        <p:nvSpPr>
+          <p:cNvPr id="4" name="Slide Number Placeholder 3"/>
+          <p:cNvSpPr>
+            <a:spLocks noGrp="1"/>
+          </p:cNvSpPr>
+          <p:nvPr>
+            <p:ph type="sldNum" sz="quarter" idx="10"/>
+          </p:nvPr>
+        </p:nvSpPr>
+        <p:spPr/>
+        <p:txBody>
+          <a:bodyPr/>
+          <a:lstStyle/>
+          <a:p>
+            <a:fld id="{18BDFEC3-8487-43E8-A154-7C12CBC1FFF2}" type="slidenum">
+              <a:rPr lang="en-US"/>
+              <a:t>4</a:t>
+            </a:fld>
+            <a:endParaRPr lang="en-US"/>
+          </a:p>
+        </p:txBody>
+      </p:sp>
+    </p:spTree>
+  </p:cSld>
+</p:notes>
+</file>
+
+<file path=ppt/notesSlides/notesSlide4.xml><?xml version="1.0" encoding="utf-8"?>
+<p:notes xmlns:a="http://schemas.openxmlformats.org/drawingml/2006/main" xmlns:r="http://schemas.openxmlformats.org/officeDocument/2006/relationships" xmlns:p="http://schemas.openxmlformats.org/presentationml/2006/main">
+  <p:cSld>
+    <p:spTree>
+      <p:nvGrpSpPr>
+        <p:cNvPr id="1" name=""/>
+        <p:cNvGrpSpPr/>
+        <p:nvPr/>
+      </p:nvGrpSpPr>
+      <p:grpSpPr>
+        <a:xfrm>
+          <a:off x="0" y="0"/>
+          <a:ext cx="0" cy="0"/>
+          <a:chOff x="0" y="0"/>
+          <a:chExt cx="0" cy="0"/>
+        </a:xfrm>
+      </p:grpSpPr>
+      <p:sp>
+        <p:nvSpPr>
+          <p:cNvPr id="2" name="Slide Image Placeholder 1"/>
+          <p:cNvSpPr>
+            <a:spLocks noGrp="1" noRot="1" noChangeAspect="1"/>
+          </p:cNvSpPr>
+          <p:nvPr>
+            <p:ph type="sldImg"/>
+          </p:nvPr>
+        </p:nvSpPr>
+        <p:spPr/>
+      </p:sp>
+      <p:sp>
+        <p:nvSpPr>
+          <p:cNvPr id="3" name="Notes Placeholder 2"/>
+          <p:cNvSpPr>
+            <a:spLocks noGrp="1"/>
+          </p:cNvSpPr>
+          <p:nvPr>
+            <p:ph type="body" idx="1"/>
+          </p:nvPr>
+        </p:nvSpPr>
+        <p:spPr/>
+        <p:txBody>
+          <a:bodyPr/>
+          <a:lstStyle/>
+          <a:p>
+            <a:pPr lvl="0" marL="0" indent="0">
+              <a:buNone/>
+            </a:pPr>
+            <a:r>
+              <a:rPr/>
+              <a:t>The</a:t>
+            </a:r>
+            <a:r>
+              <a:rPr/>
+              <a:t> </a:t>
+            </a:r>
+            <a:r>
+              <a:rPr/>
+              <a:t>color</a:t>
+            </a:r>
+            <a:r>
+              <a:rPr/>
+              <a:t> </a:t>
+            </a:r>
+            <a:r>
+              <a:rPr/>
+              <a:t>variable</a:t>
+            </a:r>
+            <a:r>
+              <a:rPr/>
+              <a:t> </a:t>
+            </a:r>
+            <a:r>
+              <a:rPr/>
+              <a:t>is</a:t>
+            </a:r>
+            <a:r>
+              <a:rPr/>
+              <a:t> </a:t>
+            </a:r>
+            <a:r>
+              <a:rPr/>
+              <a:t>defined</a:t>
+            </a:r>
+            <a:r>
+              <a:rPr/>
+              <a:t> </a:t>
+            </a:r>
+            <a:r>
+              <a:rPr/>
+              <a:t>inside</a:t>
+            </a:r>
+            <a:r>
+              <a:rPr/>
+              <a:t> </a:t>
+            </a:r>
+            <a:r>
+              <a:rPr/>
+              <a:t>the</a:t>
+            </a:r>
+            <a:r>
+              <a:rPr/>
+              <a:t> </a:t>
+            </a:r>
+            <a:r>
+              <a:rPr/>
+              <a:t>aes</a:t>
+            </a:r>
+            <a:r>
+              <a:rPr/>
+              <a:t> </a:t>
+            </a:r>
+            <a:r>
+              <a:rPr/>
+              <a:t>function.</a:t>
+            </a:r>
+          </a:p>
+        </p:txBody>
+      </p:sp>
+      <p:sp>
+        <p:nvSpPr>
+          <p:cNvPr id="4" name="Slide Number Placeholder 3"/>
+          <p:cNvSpPr>
+            <a:spLocks noGrp="1"/>
+          </p:cNvSpPr>
+          <p:nvPr>
+            <p:ph type="sldNum" sz="quarter" idx="10"/>
+          </p:nvPr>
+        </p:nvSpPr>
+        <p:spPr/>
+        <p:txBody>
+          <a:bodyPr/>
+          <a:lstStyle/>
+          <a:p>
+            <a:fld id="{18BDFEC3-8487-43E8-A154-7C12CBC1FFF2}" type="slidenum">
+              <a:rPr lang="en-US"/>
+              <a:t>5</a:t>
+            </a:fld>
+            <a:endParaRPr lang="en-US"/>
+          </a:p>
+        </p:txBody>
+      </p:sp>
+    </p:spTree>
+  </p:cSld>
+</p:notes>
+</file>
+
+<file path=ppt/notesSlides/notesSlide5.xml><?xml version="1.0" encoding="utf-8"?>
+<p:notes xmlns:a="http://schemas.openxmlformats.org/drawingml/2006/main" xmlns:r="http://schemas.openxmlformats.org/officeDocument/2006/relationships" xmlns:p="http://schemas.openxmlformats.org/presentationml/2006/main">
+  <p:cSld>
+    <p:spTree>
+      <p:nvGrpSpPr>
+        <p:cNvPr id="1" name=""/>
+        <p:cNvGrpSpPr/>
+        <p:nvPr/>
+      </p:nvGrpSpPr>
+      <p:grpSpPr>
+        <a:xfrm>
+          <a:off x="0" y="0"/>
+          <a:ext cx="0" cy="0"/>
+          <a:chOff x="0" y="0"/>
+          <a:chExt cx="0" cy="0"/>
+        </a:xfrm>
+      </p:grpSpPr>
+      <p:sp>
+        <p:nvSpPr>
+          <p:cNvPr id="2" name="Slide Image Placeholder 1"/>
+          <p:cNvSpPr>
+            <a:spLocks noGrp="1" noRot="1" noChangeAspect="1"/>
+          </p:cNvSpPr>
+          <p:nvPr>
+            <p:ph type="sldImg"/>
+          </p:nvPr>
+        </p:nvSpPr>
+        <p:spPr/>
+      </p:sp>
+      <p:sp>
+        <p:nvSpPr>
+          <p:cNvPr id="3" name="Notes Placeholder 2"/>
+          <p:cNvSpPr>
+            <a:spLocks noGrp="1"/>
+          </p:cNvSpPr>
+          <p:nvPr>
+            <p:ph type="body" idx="1"/>
+          </p:nvPr>
+        </p:nvSpPr>
+        <p:spPr/>
+        <p:txBody>
+          <a:bodyPr/>
+          <a:lstStyle/>
+          <a:p>
+            <a:pPr lvl="0" marL="0" indent="0">
+              <a:buNone/>
+            </a:pPr>
+            <a:r>
+              <a:rPr/>
+              <a:t>I</a:t>
+            </a:r>
+            <a:r>
+              <a:rPr/>
+              <a:t> </a:t>
+            </a:r>
+            <a:r>
+              <a:rPr/>
+              <a:t>deliberately</a:t>
+            </a:r>
+            <a:r>
+              <a:rPr/>
+              <a:t> </a:t>
+            </a:r>
+            <a:r>
+              <a:rPr/>
+              <a:t>defined</a:t>
+            </a:r>
+            <a:r>
+              <a:rPr/>
+              <a:t> </a:t>
+            </a:r>
+            <a:r>
+              <a:rPr/>
+              <a:t>Baths</a:t>
+            </a:r>
+            <a:r>
+              <a:rPr/>
+              <a:t> </a:t>
+            </a:r>
+            <a:r>
+              <a:rPr/>
+              <a:t>as</a:t>
+            </a:r>
+            <a:r>
+              <a:rPr/>
+              <a:t> </a:t>
+            </a:r>
+            <a:r>
+              <a:rPr/>
+              <a:t>categorical</a:t>
+            </a:r>
+            <a:r>
+              <a:rPr/>
+              <a:t> </a:t>
+            </a:r>
+            <a:r>
+              <a:rPr/>
+              <a:t>with</a:t>
+            </a:r>
+            <a:r>
+              <a:rPr/>
+              <a:t> </a:t>
+            </a:r>
+            <a:r>
+              <a:rPr/>
+              <a:t>the</a:t>
+            </a:r>
+            <a:r>
+              <a:rPr/>
+              <a:t> </a:t>
+            </a:r>
+            <a:r>
+              <a:rPr/>
+              <a:t>factor</a:t>
+            </a:r>
+            <a:r>
+              <a:rPr/>
+              <a:t> </a:t>
+            </a:r>
+            <a:r>
+              <a:rPr/>
+              <a:t>function,</a:t>
+            </a:r>
+            <a:r>
+              <a:rPr/>
+              <a:t> </a:t>
+            </a:r>
+            <a:r>
+              <a:rPr/>
+              <a:t>and</a:t>
+            </a:r>
+            <a:r>
+              <a:rPr/>
+              <a:t> </a:t>
+            </a:r>
+            <a:r>
+              <a:rPr/>
+              <a:t>notice</a:t>
+            </a:r>
+            <a:r>
+              <a:rPr/>
+              <a:t> </a:t>
+            </a:r>
+            <a:r>
+              <a:rPr/>
+              <a:t>the</a:t>
+            </a:r>
+            <a:r>
+              <a:rPr/>
+              <a:t> </a:t>
+            </a:r>
+            <a:r>
+              <a:rPr/>
+              <a:t>use</a:t>
+            </a:r>
+            <a:r>
+              <a:rPr/>
+              <a:t> </a:t>
+            </a:r>
+            <a:r>
+              <a:rPr/>
+              <a:t>of</a:t>
+            </a:r>
+            <a:r>
+              <a:rPr/>
+              <a:t> </a:t>
+            </a:r>
+            <a:r>
+              <a:rPr/>
+              <a:t>discrete</a:t>
+            </a:r>
+            <a:r>
+              <a:rPr/>
+              <a:t> </a:t>
+            </a:r>
+            <a:r>
+              <a:rPr/>
+              <a:t>colors</a:t>
+            </a:r>
+            <a:r>
+              <a:rPr/>
+              <a:t> </a:t>
+            </a:r>
+            <a:r>
+              <a:rPr/>
+              <a:t>again</a:t>
+            </a:r>
+            <a:r>
+              <a:rPr/>
+              <a:t> </a:t>
+            </a:r>
+            <a:r>
+              <a:rPr/>
+              <a:t>rather</a:t>
+            </a:r>
+            <a:r>
+              <a:rPr/>
+              <a:t> </a:t>
+            </a:r>
+            <a:r>
+              <a:rPr/>
+              <a:t>than</a:t>
+            </a:r>
+            <a:r>
+              <a:rPr/>
+              <a:t> </a:t>
+            </a:r>
+            <a:r>
+              <a:rPr/>
+              <a:t>a</a:t>
+            </a:r>
+            <a:r>
+              <a:rPr/>
+              <a:t> </a:t>
+            </a:r>
+            <a:r>
+              <a:rPr/>
+              <a:t>gradient.</a:t>
+            </a:r>
+          </a:p>
+        </p:txBody>
+      </p:sp>
+      <p:sp>
+        <p:nvSpPr>
+          <p:cNvPr id="4" name="Slide Number Placeholder 3"/>
+          <p:cNvSpPr>
+            <a:spLocks noGrp="1"/>
+          </p:cNvSpPr>
+          <p:nvPr>
+            <p:ph type="sldNum" sz="quarter" idx="10"/>
+          </p:nvPr>
+        </p:nvSpPr>
+        <p:spPr/>
+        <p:txBody>
+          <a:bodyPr/>
+          <a:lstStyle/>
+          <a:p>
+            <a:fld id="{18BDFEC3-8487-43E8-A154-7C12CBC1FFF2}" type="slidenum">
+              <a:rPr lang="en-US"/>
+              <a:t>6</a:t>
+            </a:fld>
+            <a:endParaRPr lang="en-US"/>
+          </a:p>
+        </p:txBody>
+      </p:sp>
+    </p:spTree>
+  </p:cSld>
+</p:notes>
+</file>
+
+<file path=ppt/notesSlides/notesSlide6.xml><?xml version="1.0" encoding="utf-8"?>
+<p:notes xmlns:a="http://schemas.openxmlformats.org/drawingml/2006/main" xmlns:r="http://schemas.openxmlformats.org/officeDocument/2006/relationships" xmlns:p="http://schemas.openxmlformats.org/presentationml/2006/main">
+  <p:cSld>
+    <p:spTree>
+      <p:nvGrpSpPr>
+        <p:cNvPr id="1" name=""/>
+        <p:cNvGrpSpPr/>
+        <p:nvPr/>
+      </p:nvGrpSpPr>
+      <p:grpSpPr>
+        <a:xfrm>
+          <a:off x="0" y="0"/>
+          <a:ext cx="0" cy="0"/>
+          <a:chOff x="0" y="0"/>
+          <a:chExt cx="0" cy="0"/>
+        </a:xfrm>
+      </p:grpSpPr>
+      <p:sp>
+        <p:nvSpPr>
+          <p:cNvPr id="2" name="Slide Image Placeholder 1"/>
+          <p:cNvSpPr>
+            <a:spLocks noGrp="1" noRot="1" noChangeAspect="1"/>
+          </p:cNvSpPr>
+          <p:nvPr>
+            <p:ph type="sldImg"/>
+          </p:nvPr>
+        </p:nvSpPr>
+        <p:spPr/>
+      </p:sp>
+      <p:sp>
+        <p:nvSpPr>
+          <p:cNvPr id="3" name="Notes Placeholder 2"/>
+          <p:cNvSpPr>
+            <a:spLocks noGrp="1"/>
+          </p:cNvSpPr>
+          <p:nvPr>
+            <p:ph type="body" idx="1"/>
+          </p:nvPr>
+        </p:nvSpPr>
+        <p:spPr/>
+        <p:txBody>
+          <a:bodyPr/>
+          <a:lstStyle/>
+          <a:p>
+            <a:pPr lvl="0" marL="0" indent="0">
+              <a:buNone/>
+            </a:pPr>
+            <a:r>
+              <a:rPr/>
+              <a:t>I</a:t>
+            </a:r>
+            <a:r>
+              <a:rPr/>
+              <a:t> </a:t>
+            </a:r>
+            <a:r>
+              <a:rPr/>
+              <a:t>deliberately</a:t>
+            </a:r>
+            <a:r>
+              <a:rPr/>
+              <a:t> </a:t>
+            </a:r>
+            <a:r>
+              <a:rPr/>
+              <a:t>defined</a:t>
+            </a:r>
+            <a:r>
+              <a:rPr/>
+              <a:t> </a:t>
+            </a:r>
+            <a:r>
+              <a:rPr/>
+              <a:t>Baths</a:t>
+            </a:r>
+            <a:r>
+              <a:rPr/>
+              <a:t> </a:t>
+            </a:r>
+            <a:r>
+              <a:rPr/>
+              <a:t>as</a:t>
+            </a:r>
+            <a:r>
+              <a:rPr/>
+              <a:t> </a:t>
+            </a:r>
+            <a:r>
+              <a:rPr/>
+              <a:t>Dimension</a:t>
+            </a:r>
+            <a:r>
+              <a:rPr/>
+              <a:t> </a:t>
+            </a:r>
+            <a:r>
+              <a:rPr/>
+              <a:t>Categorical</a:t>
+            </a:r>
+            <a:r>
+              <a:rPr/>
+              <a:t> </a:t>
+            </a:r>
+            <a:r>
+              <a:rPr/>
+              <a:t>(blue</a:t>
+            </a:r>
+            <a:r>
+              <a:rPr/>
+              <a:t> </a:t>
+            </a:r>
+            <a:r>
+              <a:rPr/>
+              <a:t>pill)</a:t>
+            </a:r>
+            <a:r>
+              <a:rPr/>
+              <a:t> </a:t>
+            </a:r>
+            <a:r>
+              <a:rPr/>
+              <a:t>to</a:t>
+            </a:r>
+            <a:r>
+              <a:rPr/>
+              <a:t> </a:t>
+            </a:r>
+            <a:r>
+              <a:rPr/>
+              <a:t>show</a:t>
+            </a:r>
+            <a:r>
+              <a:rPr/>
+              <a:t> </a:t>
+            </a:r>
+            <a:r>
+              <a:rPr/>
+              <a:t>the</a:t>
+            </a:r>
+            <a:r>
+              <a:rPr/>
+              <a:t> </a:t>
+            </a:r>
+            <a:r>
+              <a:rPr/>
+              <a:t>contrast.</a:t>
+            </a:r>
+            <a:r>
+              <a:rPr/>
+              <a:t> </a:t>
+            </a:r>
+            <a:r>
+              <a:rPr/>
+              <a:t>Notice</a:t>
+            </a:r>
+            <a:r>
+              <a:rPr/>
+              <a:t> </a:t>
+            </a:r>
+            <a:r>
+              <a:rPr/>
+              <a:t>that</a:t>
+            </a:r>
+            <a:r>
+              <a:rPr/>
+              <a:t> </a:t>
+            </a:r>
+            <a:r>
+              <a:rPr/>
+              <a:t>the</a:t>
+            </a:r>
+            <a:r>
+              <a:rPr/>
+              <a:t> </a:t>
+            </a:r>
+            <a:r>
+              <a:rPr/>
+              <a:t>colors</a:t>
+            </a:r>
+            <a:r>
+              <a:rPr/>
+              <a:t> </a:t>
+            </a:r>
+            <a:r>
+              <a:rPr/>
+              <a:t>are</a:t>
+            </a:r>
+            <a:r>
+              <a:rPr/>
+              <a:t> </a:t>
+            </a:r>
+            <a:r>
+              <a:rPr/>
+              <a:t>discrete</a:t>
+            </a:r>
+            <a:r>
+              <a:rPr/>
+              <a:t> </a:t>
+            </a:r>
+            <a:r>
+              <a:rPr/>
+              <a:t>well</a:t>
+            </a:r>
+            <a:r>
+              <a:rPr/>
+              <a:t> </a:t>
+            </a:r>
+            <a:r>
+              <a:rPr/>
+              <a:t>separated</a:t>
+            </a:r>
+            <a:r>
+              <a:rPr/>
+              <a:t> </a:t>
+            </a:r>
+            <a:r>
+              <a:rPr/>
+              <a:t>values.</a:t>
+            </a:r>
+          </a:p>
+        </p:txBody>
+      </p:sp>
+      <p:sp>
+        <p:nvSpPr>
+          <p:cNvPr id="4" name="Slide Number Placeholder 3"/>
+          <p:cNvSpPr>
+            <a:spLocks noGrp="1"/>
+          </p:cNvSpPr>
+          <p:nvPr>
+            <p:ph type="sldNum" sz="quarter" idx="10"/>
+          </p:nvPr>
+        </p:nvSpPr>
+        <p:spPr/>
+        <p:txBody>
+          <a:bodyPr/>
+          <a:lstStyle/>
+          <a:p>
+            <a:fld id="{18BDFEC3-8487-43E8-A154-7C12CBC1FFF2}" type="slidenum">
+              <a:rPr lang="en-US"/>
+              <a:t>7</a:t>
             </a:fld>
             <a:endParaRPr lang="en-US"/>
           </a:p>
@@ -4179,7 +5355,7 @@
           <p:nvPr/>
         </p:nvPicPr>
         <p:blipFill>
-          <a:blip r:embed="rId2"/>
+          <a:blip r:embed="rId3"/>
           <a:stretch>
             <a:fillRect/>
           </a:stretch>
@@ -4440,7 +5616,7 @@
           <p:nvPr/>
         </p:nvPicPr>
         <p:blipFill>
-          <a:blip r:embed="rId2"/>
+          <a:blip r:embed="rId3"/>
           <a:stretch>
             <a:fillRect/>
           </a:stretch>
@@ -4603,7 +5779,7 @@
           <p:nvPr/>
         </p:nvPicPr>
         <p:blipFill>
-          <a:blip r:embed="rId2"/>
+          <a:blip r:embed="rId3"/>
           <a:stretch>
             <a:fillRect/>
           </a:stretch>

</xml_diff>